<commit_message>
Initial process automation and metric renaming completed.
</commit_message>
<xml_diff>
--- a/docs/Tracking_Metrics.pptx
+++ b/docs/Tracking_Metrics.pptx
@@ -5,10 +5,10 @@
     <p:sldMasterId id="2147483648" r:id="rId1"/>
   </p:sldMasterIdLst>
   <p:notesMasterIdLst>
-    <p:notesMasterId r:id="rId14"/>
+    <p:notesMasterId r:id="rId16"/>
   </p:notesMasterIdLst>
   <p:handoutMasterIdLst>
-    <p:handoutMasterId r:id="rId15"/>
+    <p:handoutMasterId r:id="rId17"/>
   </p:handoutMasterIdLst>
   <p:sldIdLst>
     <p:sldId id="327" r:id="rId2"/>
@@ -20,9 +20,11 @@
     <p:sldId id="466" r:id="rId8"/>
     <p:sldId id="467" r:id="rId9"/>
     <p:sldId id="468" r:id="rId10"/>
-    <p:sldId id="470" r:id="rId11"/>
-    <p:sldId id="471" r:id="rId12"/>
-    <p:sldId id="271" r:id="rId13"/>
+    <p:sldId id="473" r:id="rId11"/>
+    <p:sldId id="474" r:id="rId12"/>
+    <p:sldId id="470" r:id="rId13"/>
+    <p:sldId id="471" r:id="rId14"/>
+    <p:sldId id="271" r:id="rId15"/>
   </p:sldIdLst>
   <p:sldSz cx="12192000" cy="6858000"/>
   <p:notesSz cx="6858000" cy="9144000"/>
@@ -226,7 +228,7 @@
           <a:p>
             <a:fld id="{070E89A9-CEF9-4D06-9E6C-F2D26CB40354}" type="datetimeFigureOut">
               <a:rPr lang="en-US" smtClean="0"/>
-              <a:t>8/10/20</a:t>
+              <a:t>11/30/20</a:t>
             </a:fld>
             <a:endParaRPr lang="en-US"/>
           </a:p>
@@ -2075,7 +2077,7 @@
           <a:p>
             <a:fld id="{86E2EA99-5A5B-427C-A39C-0013FB3F6F45}" type="datetimeFigureOut">
               <a:rPr lang="en-US" smtClean="0"/>
-              <a:t>8/10/20</a:t>
+              <a:t>11/30/20</a:t>
             </a:fld>
             <a:endParaRPr lang="en-US"/>
           </a:p>
@@ -4412,7 +4414,7 @@
           <a:p>
             <a:fld id="{2DAA6965-2223-4D7A-92F9-D1E7E5126F16}" type="slidenum">
               <a:rPr lang="en-US" smtClean="0"/>
-              <a:t>11</a:t>
+              <a:t>13</a:t>
             </a:fld>
             <a:endParaRPr lang="en-US"/>
           </a:p>
@@ -41360,8 +41362,14 @@
             </a:pPr>
             <a:r>
               <a:rPr lang="en-US" dirty="0"/>
-              <a:t>Percentage of time the trail is behind the basketball in half court</a:t>
+              <a:t>Percentage of time the trail leaves a play early</a:t>
             </a:r>
+          </a:p>
+          <a:p>
+            <a:pPr>
+              <a:buNone/>
+            </a:pPr>
+            <a:endParaRPr lang="en-US" dirty="0"/>
           </a:p>
           <a:p>
             <a:pPr>
@@ -41381,14 +41389,8 @@
             </a:pPr>
             <a:r>
               <a:rPr lang="en-US" dirty="0"/>
-              <a:t>Ranked from largest to smallest percentage</a:t>
+              <a:t>Ranked from smallest to largest percentage</a:t>
             </a:r>
-          </a:p>
-          <a:p>
-            <a:pPr>
-              <a:buNone/>
-            </a:pPr>
-            <a:endParaRPr lang="en-US" dirty="0"/>
           </a:p>
         </p:txBody>
       </p:sp>
@@ -41408,7 +41410,1285 @@
             <p:ph idx="20"/>
             <p:extLst>
               <p:ext uri="{D42A27DB-BD31-4B8C-83A1-F6EECF244321}">
-                <p14:modId xmlns:p14="http://schemas.microsoft.com/office/powerpoint/2010/main" val="1217284745"/>
+                <p14:modId xmlns:p14="http://schemas.microsoft.com/office/powerpoint/2010/main" val="87530329"/>
+              </p:ext>
+            </p:extLst>
+          </p:nvPr>
+        </p:nvGraphicFramePr>
+        <p:xfrm>
+          <a:off x="6527800" y="1563688"/>
+          <a:ext cx="5039854" cy="1483360"/>
+        </p:xfrm>
+        <a:graphic>
+          <a:graphicData uri="http://schemas.openxmlformats.org/drawingml/2006/table">
+            <a:tbl>
+              <a:tblPr firstRow="1" bandRow="1">
+                <a:tableStyleId>{5C22544A-7EE6-4342-B048-85BDC9FD1C3A}</a:tableStyleId>
+              </a:tblPr>
+              <a:tblGrid>
+                <a:gridCol w="2273300">
+                  <a:extLst>
+                    <a:ext uri="{9D8B030D-6E8A-4147-A177-3AD203B41FA5}">
+                      <a16:colId xmlns:a16="http://schemas.microsoft.com/office/drawing/2014/main" val="1152472493"/>
+                    </a:ext>
+                  </a:extLst>
+                </a:gridCol>
+                <a:gridCol w="805180">
+                  <a:extLst>
+                    <a:ext uri="{9D8B030D-6E8A-4147-A177-3AD203B41FA5}">
+                      <a16:colId xmlns:a16="http://schemas.microsoft.com/office/drawing/2014/main" val="3994125328"/>
+                    </a:ext>
+                  </a:extLst>
+                </a:gridCol>
+                <a:gridCol w="1961374">
+                  <a:extLst>
+                    <a:ext uri="{9D8B030D-6E8A-4147-A177-3AD203B41FA5}">
+                      <a16:colId xmlns:a16="http://schemas.microsoft.com/office/drawing/2014/main" val="331443097"/>
+                    </a:ext>
+                  </a:extLst>
+                </a:gridCol>
+              </a:tblGrid>
+              <a:tr h="370840">
+                <a:tc>
+                  <a:txBody>
+                    <a:bodyPr/>
+                    <a:lstStyle/>
+                    <a:p>
+                      <a:r>
+                        <a:rPr lang="en-US" dirty="0"/>
+                        <a:t>Official</a:t>
+                      </a:r>
+                    </a:p>
+                  </a:txBody>
+                  <a:tcPr/>
+                </a:tc>
+                <a:tc>
+                  <a:txBody>
+                    <a:bodyPr/>
+                    <a:lstStyle/>
+                    <a:p>
+                      <a:r>
+                        <a:rPr lang="en-US" dirty="0"/>
+                        <a:t>Rank</a:t>
+                      </a:r>
+                    </a:p>
+                  </a:txBody>
+                  <a:tcPr/>
+                </a:tc>
+                <a:tc>
+                  <a:txBody>
+                    <a:bodyPr/>
+                    <a:lstStyle/>
+                    <a:p>
+                      <a:r>
+                        <a:rPr lang="en-US" dirty="0"/>
+                        <a:t>Percentage</a:t>
+                      </a:r>
+                    </a:p>
+                  </a:txBody>
+                  <a:tcPr/>
+                </a:tc>
+                <a:extLst>
+                  <a:ext uri="{0D108BD9-81ED-4DB2-BD59-A6C34878D82A}">
+                    <a16:rowId xmlns:a16="http://schemas.microsoft.com/office/drawing/2014/main" val="1447378793"/>
+                  </a:ext>
+                </a:extLst>
+              </a:tr>
+              <a:tr h="370840">
+                <a:tc>
+                  <a:txBody>
+                    <a:bodyPr/>
+                    <a:lstStyle/>
+                    <a:p>
+                      <a:r>
+                        <a:rPr lang="en-US" dirty="0" err="1"/>
+                        <a:t>Suyash</a:t>
+                      </a:r>
+                      <a:r>
+                        <a:rPr lang="en-US" dirty="0"/>
+                        <a:t> Mehta</a:t>
+                      </a:r>
+                    </a:p>
+                  </a:txBody>
+                  <a:tcPr/>
+                </a:tc>
+                <a:tc>
+                  <a:txBody>
+                    <a:bodyPr/>
+                    <a:lstStyle/>
+                    <a:p>
+                      <a:r>
+                        <a:rPr lang="en-US" dirty="0"/>
+                        <a:t>1</a:t>
+                      </a:r>
+                    </a:p>
+                  </a:txBody>
+                  <a:tcPr/>
+                </a:tc>
+                <a:tc>
+                  <a:txBody>
+                    <a:bodyPr/>
+                    <a:lstStyle/>
+                    <a:p>
+                      <a:r>
+                        <a:rPr lang="en-US" dirty="0"/>
+                        <a:t>5.0%</a:t>
+                      </a:r>
+                    </a:p>
+                  </a:txBody>
+                  <a:tcPr/>
+                </a:tc>
+                <a:extLst>
+                  <a:ext uri="{0D108BD9-81ED-4DB2-BD59-A6C34878D82A}">
+                    <a16:rowId xmlns:a16="http://schemas.microsoft.com/office/drawing/2014/main" val="2486154750"/>
+                  </a:ext>
+                </a:extLst>
+              </a:tr>
+              <a:tr h="370840">
+                <a:tc>
+                  <a:txBody>
+                    <a:bodyPr/>
+                    <a:lstStyle/>
+                    <a:p>
+                      <a:r>
+                        <a:rPr lang="en-US" dirty="0" err="1"/>
+                        <a:t>Phenziee</a:t>
+                      </a:r>
+                      <a:r>
+                        <a:rPr lang="en-US" dirty="0"/>
+                        <a:t> Ransom</a:t>
+                      </a:r>
+                    </a:p>
+                  </a:txBody>
+                  <a:tcPr/>
+                </a:tc>
+                <a:tc>
+                  <a:txBody>
+                    <a:bodyPr/>
+                    <a:lstStyle/>
+                    <a:p>
+                      <a:r>
+                        <a:rPr lang="en-US" dirty="0"/>
+                        <a:t>2</a:t>
+                      </a:r>
+                    </a:p>
+                  </a:txBody>
+                  <a:tcPr/>
+                </a:tc>
+                <a:tc>
+                  <a:txBody>
+                    <a:bodyPr/>
+                    <a:lstStyle/>
+                    <a:p>
+                      <a:r>
+                        <a:rPr lang="en-US" dirty="0"/>
+                        <a:t>5.1%</a:t>
+                      </a:r>
+                    </a:p>
+                  </a:txBody>
+                  <a:tcPr/>
+                </a:tc>
+                <a:extLst>
+                  <a:ext uri="{0D108BD9-81ED-4DB2-BD59-A6C34878D82A}">
+                    <a16:rowId xmlns:a16="http://schemas.microsoft.com/office/drawing/2014/main" val="1298332794"/>
+                  </a:ext>
+                </a:extLst>
+              </a:tr>
+              <a:tr h="370840">
+                <a:tc>
+                  <a:txBody>
+                    <a:bodyPr/>
+                    <a:lstStyle/>
+                    <a:p>
+                      <a:r>
+                        <a:rPr lang="en-US" dirty="0"/>
+                        <a:t>Matt Meyers</a:t>
+                      </a:r>
+                    </a:p>
+                  </a:txBody>
+                  <a:tcPr/>
+                </a:tc>
+                <a:tc>
+                  <a:txBody>
+                    <a:bodyPr/>
+                    <a:lstStyle/>
+                    <a:p>
+                      <a:r>
+                        <a:rPr lang="en-US" dirty="0"/>
+                        <a:t>3</a:t>
+                      </a:r>
+                    </a:p>
+                  </a:txBody>
+                  <a:tcPr/>
+                </a:tc>
+                <a:tc>
+                  <a:txBody>
+                    <a:bodyPr/>
+                    <a:lstStyle/>
+                    <a:p>
+                      <a:r>
+                        <a:rPr lang="en-US" dirty="0"/>
+                        <a:t>5.3%</a:t>
+                      </a:r>
+                    </a:p>
+                  </a:txBody>
+                  <a:tcPr/>
+                </a:tc>
+                <a:extLst>
+                  <a:ext uri="{0D108BD9-81ED-4DB2-BD59-A6C34878D82A}">
+                    <a16:rowId xmlns:a16="http://schemas.microsoft.com/office/drawing/2014/main" val="408068890"/>
+                  </a:ext>
+                </a:extLst>
+              </a:tr>
+            </a:tbl>
+          </a:graphicData>
+        </a:graphic>
+      </p:graphicFrame>
+      <p:graphicFrame>
+        <p:nvGraphicFramePr>
+          <p:cNvPr id="17" name="Table 17">
+            <a:extLst>
+              <a:ext uri="{FF2B5EF4-FFF2-40B4-BE49-F238E27FC236}">
+                <a16:creationId xmlns:a16="http://schemas.microsoft.com/office/drawing/2014/main" id="{EC298422-1145-0B4C-8837-CFDFAFB2A070}"/>
+              </a:ext>
+            </a:extLst>
+          </p:cNvPr>
+          <p:cNvGraphicFramePr>
+            <a:graphicFrameLocks noGrp="1"/>
+          </p:cNvGraphicFramePr>
+          <p:nvPr>
+            <p:ph idx="22"/>
+            <p:extLst>
+              <p:ext uri="{D42A27DB-BD31-4B8C-83A1-F6EECF244321}">
+                <p14:modId xmlns:p14="http://schemas.microsoft.com/office/powerpoint/2010/main" val="3043388669"/>
+              </p:ext>
+            </p:extLst>
+          </p:nvPr>
+        </p:nvGraphicFramePr>
+        <p:xfrm>
+          <a:off x="6527800" y="4170363"/>
+          <a:ext cx="4926754" cy="1483360"/>
+        </p:xfrm>
+        <a:graphic>
+          <a:graphicData uri="http://schemas.openxmlformats.org/drawingml/2006/table">
+            <a:tbl>
+              <a:tblPr firstRow="1" bandRow="1">
+                <a:tableStyleId>{5C22544A-7EE6-4342-B048-85BDC9FD1C3A}</a:tableStyleId>
+              </a:tblPr>
+              <a:tblGrid>
+                <a:gridCol w="2363153">
+                  <a:extLst>
+                    <a:ext uri="{9D8B030D-6E8A-4147-A177-3AD203B41FA5}">
+                      <a16:colId xmlns:a16="http://schemas.microsoft.com/office/drawing/2014/main" val="646766393"/>
+                    </a:ext>
+                  </a:extLst>
+                </a:gridCol>
+                <a:gridCol w="805180">
+                  <a:extLst>
+                    <a:ext uri="{9D8B030D-6E8A-4147-A177-3AD203B41FA5}">
+                      <a16:colId xmlns:a16="http://schemas.microsoft.com/office/drawing/2014/main" val="681690189"/>
+                    </a:ext>
+                  </a:extLst>
+                </a:gridCol>
+                <a:gridCol w="1758421">
+                  <a:extLst>
+                    <a:ext uri="{9D8B030D-6E8A-4147-A177-3AD203B41FA5}">
+                      <a16:colId xmlns:a16="http://schemas.microsoft.com/office/drawing/2014/main" val="1336115010"/>
+                    </a:ext>
+                  </a:extLst>
+                </a:gridCol>
+              </a:tblGrid>
+              <a:tr h="370840">
+                <a:tc>
+                  <a:txBody>
+                    <a:bodyPr/>
+                    <a:lstStyle/>
+                    <a:p>
+                      <a:r>
+                        <a:rPr lang="en-US" dirty="0"/>
+                        <a:t>Official</a:t>
+                      </a:r>
+                    </a:p>
+                  </a:txBody>
+                  <a:tcPr/>
+                </a:tc>
+                <a:tc>
+                  <a:txBody>
+                    <a:bodyPr/>
+                    <a:lstStyle/>
+                    <a:p>
+                      <a:r>
+                        <a:rPr lang="en-US" dirty="0"/>
+                        <a:t>Rank</a:t>
+                      </a:r>
+                    </a:p>
+                  </a:txBody>
+                  <a:tcPr/>
+                </a:tc>
+                <a:tc>
+                  <a:txBody>
+                    <a:bodyPr/>
+                    <a:lstStyle/>
+                    <a:p>
+                      <a:r>
+                        <a:rPr lang="en-US" dirty="0"/>
+                        <a:t>Percentage</a:t>
+                      </a:r>
+                    </a:p>
+                  </a:txBody>
+                  <a:tcPr/>
+                </a:tc>
+                <a:extLst>
+                  <a:ext uri="{0D108BD9-81ED-4DB2-BD59-A6C34878D82A}">
+                    <a16:rowId xmlns:a16="http://schemas.microsoft.com/office/drawing/2014/main" val="655686281"/>
+                  </a:ext>
+                </a:extLst>
+              </a:tr>
+              <a:tr h="370840">
+                <a:tc>
+                  <a:txBody>
+                    <a:bodyPr/>
+                    <a:lstStyle/>
+                    <a:p>
+                      <a:r>
+                        <a:rPr lang="en-US" dirty="0"/>
+                        <a:t>Haywoode Workman</a:t>
+                      </a:r>
+                    </a:p>
+                  </a:txBody>
+                  <a:tcPr/>
+                </a:tc>
+                <a:tc>
+                  <a:txBody>
+                    <a:bodyPr/>
+                    <a:lstStyle/>
+                    <a:p>
+                      <a:r>
+                        <a:rPr lang="en-US" dirty="0"/>
+                        <a:t>72</a:t>
+                      </a:r>
+                    </a:p>
+                  </a:txBody>
+                  <a:tcPr/>
+                </a:tc>
+                <a:tc>
+                  <a:txBody>
+                    <a:bodyPr/>
+                    <a:lstStyle/>
+                    <a:p>
+                      <a:r>
+                        <a:rPr lang="en-US" dirty="0"/>
+                        <a:t>9.2%</a:t>
+                      </a:r>
+                    </a:p>
+                  </a:txBody>
+                  <a:tcPr/>
+                </a:tc>
+                <a:extLst>
+                  <a:ext uri="{0D108BD9-81ED-4DB2-BD59-A6C34878D82A}">
+                    <a16:rowId xmlns:a16="http://schemas.microsoft.com/office/drawing/2014/main" val="1508582785"/>
+                  </a:ext>
+                </a:extLst>
+              </a:tr>
+              <a:tr h="370840">
+                <a:tc>
+                  <a:txBody>
+                    <a:bodyPr/>
+                    <a:lstStyle/>
+                    <a:p>
+                      <a:r>
+                        <a:rPr lang="en-US" dirty="0"/>
+                        <a:t>Matt Boland</a:t>
+                      </a:r>
+                    </a:p>
+                  </a:txBody>
+                  <a:tcPr/>
+                </a:tc>
+                <a:tc>
+                  <a:txBody>
+                    <a:bodyPr/>
+                    <a:lstStyle/>
+                    <a:p>
+                      <a:r>
+                        <a:rPr lang="en-US" dirty="0"/>
+                        <a:t>71</a:t>
+                      </a:r>
+                    </a:p>
+                  </a:txBody>
+                  <a:tcPr/>
+                </a:tc>
+                <a:tc>
+                  <a:txBody>
+                    <a:bodyPr/>
+                    <a:lstStyle/>
+                    <a:p>
+                      <a:r>
+                        <a:rPr lang="en-US" b="0" dirty="0"/>
+                        <a:t>8.9%</a:t>
+                      </a:r>
+                    </a:p>
+                  </a:txBody>
+                  <a:tcPr/>
+                </a:tc>
+                <a:extLst>
+                  <a:ext uri="{0D108BD9-81ED-4DB2-BD59-A6C34878D82A}">
+                    <a16:rowId xmlns:a16="http://schemas.microsoft.com/office/drawing/2014/main" val="2452456301"/>
+                  </a:ext>
+                </a:extLst>
+              </a:tr>
+              <a:tr h="370840">
+                <a:tc>
+                  <a:txBody>
+                    <a:bodyPr/>
+                    <a:lstStyle/>
+                    <a:p>
+                      <a:r>
+                        <a:rPr lang="en-US" dirty="0"/>
+                        <a:t>John Conley</a:t>
+                      </a:r>
+                    </a:p>
+                  </a:txBody>
+                  <a:tcPr/>
+                </a:tc>
+                <a:tc>
+                  <a:txBody>
+                    <a:bodyPr/>
+                    <a:lstStyle/>
+                    <a:p>
+                      <a:r>
+                        <a:rPr lang="en-US" dirty="0"/>
+                        <a:t>70</a:t>
+                      </a:r>
+                    </a:p>
+                  </a:txBody>
+                  <a:tcPr/>
+                </a:tc>
+                <a:tc>
+                  <a:txBody>
+                    <a:bodyPr/>
+                    <a:lstStyle/>
+                    <a:p>
+                      <a:r>
+                        <a:rPr lang="en-US" dirty="0"/>
+                        <a:t>8.5%</a:t>
+                      </a:r>
+                    </a:p>
+                  </a:txBody>
+                  <a:tcPr/>
+                </a:tc>
+                <a:extLst>
+                  <a:ext uri="{0D108BD9-81ED-4DB2-BD59-A6C34878D82A}">
+                    <a16:rowId xmlns:a16="http://schemas.microsoft.com/office/drawing/2014/main" val="2727737611"/>
+                  </a:ext>
+                </a:extLst>
+              </a:tr>
+            </a:tbl>
+          </a:graphicData>
+        </a:graphic>
+      </p:graphicFrame>
+      <p:sp>
+        <p:nvSpPr>
+          <p:cNvPr id="6" name="Title 5">
+            <a:extLst>
+              <a:ext uri="{FF2B5EF4-FFF2-40B4-BE49-F238E27FC236}">
+                <a16:creationId xmlns:a16="http://schemas.microsoft.com/office/drawing/2014/main" id="{388EF6F7-5CE8-BB47-84D5-D92080497422}"/>
+              </a:ext>
+            </a:extLst>
+          </p:cNvPr>
+          <p:cNvSpPr>
+            <a:spLocks noGrp="1"/>
+          </p:cNvSpPr>
+          <p:nvPr>
+            <p:ph type="title"/>
+          </p:nvPr>
+        </p:nvSpPr>
+        <p:spPr/>
+        <p:txBody>
+          <a:bodyPr/>
+          <a:lstStyle/>
+          <a:p>
+            <a:r>
+              <a:rPr lang="en-US" dirty="0"/>
+              <a:t>Half Court Metrics</a:t>
+            </a:r>
+          </a:p>
+        </p:txBody>
+      </p:sp>
+      <p:sp>
+        <p:nvSpPr>
+          <p:cNvPr id="7" name="Subtitle 6">
+            <a:extLst>
+              <a:ext uri="{FF2B5EF4-FFF2-40B4-BE49-F238E27FC236}">
+                <a16:creationId xmlns:a16="http://schemas.microsoft.com/office/drawing/2014/main" id="{7120B7AA-289A-C14B-9153-D9776F714588}"/>
+              </a:ext>
+            </a:extLst>
+          </p:cNvPr>
+          <p:cNvSpPr>
+            <a:spLocks noGrp="1"/>
+          </p:cNvSpPr>
+          <p:nvPr>
+            <p:ph type="subTitle" idx="1"/>
+          </p:nvPr>
+        </p:nvSpPr>
+        <p:spPr/>
+        <p:txBody>
+          <a:bodyPr/>
+          <a:lstStyle/>
+          <a:p>
+            <a:r>
+              <a:rPr lang="en-US" dirty="0"/>
+              <a:t>Trail Retreating</a:t>
+            </a:r>
+          </a:p>
+          <a:p>
+            <a:endParaRPr lang="en-US" dirty="0"/>
+          </a:p>
+        </p:txBody>
+      </p:sp>
+    </p:spTree>
+    <p:extLst>
+      <p:ext uri="{BB962C8B-B14F-4D97-AF65-F5344CB8AC3E}">
+        <p14:creationId xmlns:p14="http://schemas.microsoft.com/office/powerpoint/2010/main" val="1228778323"/>
+      </p:ext>
+    </p:extLst>
+  </p:cSld>
+  <p:clrMapOvr>
+    <a:masterClrMapping/>
+  </p:clrMapOvr>
+</p:sld>
+</file>
+
+<file path=ppt/slides/slide11.xml><?xml version="1.0" encoding="utf-8"?>
+<p:sld xmlns:a="http://schemas.openxmlformats.org/drawingml/2006/main" xmlns:r="http://schemas.openxmlformats.org/officeDocument/2006/relationships" xmlns:p="http://schemas.openxmlformats.org/presentationml/2006/main">
+  <p:cSld>
+    <p:spTree>
+      <p:nvGrpSpPr>
+        <p:cNvPr id="1" name=""/>
+        <p:cNvGrpSpPr/>
+        <p:nvPr/>
+      </p:nvGrpSpPr>
+      <p:grpSpPr>
+        <a:xfrm>
+          <a:off x="0" y="0"/>
+          <a:ext cx="0" cy="0"/>
+          <a:chOff x="0" y="0"/>
+          <a:chExt cx="0" cy="0"/>
+        </a:xfrm>
+      </p:grpSpPr>
+      <p:sp>
+        <p:nvSpPr>
+          <p:cNvPr id="9" name="Content Placeholder 8">
+            <a:extLst>
+              <a:ext uri="{FF2B5EF4-FFF2-40B4-BE49-F238E27FC236}">
+                <a16:creationId xmlns:a16="http://schemas.microsoft.com/office/drawing/2014/main" id="{C3180D1D-F4A7-D745-ABB4-EA8C3494AD35}"/>
+              </a:ext>
+            </a:extLst>
+          </p:cNvPr>
+          <p:cNvSpPr>
+            <a:spLocks noGrp="1"/>
+          </p:cNvSpPr>
+          <p:nvPr>
+            <p:ph idx="14"/>
+          </p:nvPr>
+        </p:nvSpPr>
+        <p:spPr>
+          <a:xfrm>
+            <a:off x="500139" y="1563625"/>
+            <a:ext cx="5276088" cy="4690871"/>
+          </a:xfrm>
+        </p:spPr>
+        <p:txBody>
+          <a:bodyPr/>
+          <a:lstStyle/>
+          <a:p>
+            <a:pPr>
+              <a:buNone/>
+            </a:pPr>
+            <a:r>
+              <a:rPr lang="en-US" dirty="0"/>
+              <a:t>Percentage of time the slot is within 3 feet of the FT Line</a:t>
+            </a:r>
+          </a:p>
+          <a:p>
+            <a:pPr>
+              <a:buNone/>
+            </a:pPr>
+            <a:endParaRPr lang="en-US" dirty="0"/>
+          </a:p>
+          <a:p>
+            <a:pPr>
+              <a:buNone/>
+            </a:pPr>
+            <a:endParaRPr lang="en-US" dirty="0"/>
+          </a:p>
+          <a:p>
+            <a:pPr>
+              <a:buNone/>
+            </a:pPr>
+            <a:r>
+              <a:rPr lang="en-US" dirty="0"/>
+              <a:t>Ranked from largest to smallest percentage</a:t>
+            </a:r>
+          </a:p>
+        </p:txBody>
+      </p:sp>
+      <p:graphicFrame>
+        <p:nvGraphicFramePr>
+          <p:cNvPr id="16" name="Table 16">
+            <a:extLst>
+              <a:ext uri="{FF2B5EF4-FFF2-40B4-BE49-F238E27FC236}">
+                <a16:creationId xmlns:a16="http://schemas.microsoft.com/office/drawing/2014/main" id="{8B2DA1A7-5F68-9A41-A21E-DD4740E0CB8B}"/>
+              </a:ext>
+            </a:extLst>
+          </p:cNvPr>
+          <p:cNvGraphicFramePr>
+            <a:graphicFrameLocks noGrp="1"/>
+          </p:cNvGraphicFramePr>
+          <p:nvPr>
+            <p:ph idx="20"/>
+            <p:extLst>
+              <p:ext uri="{D42A27DB-BD31-4B8C-83A1-F6EECF244321}">
+                <p14:modId xmlns:p14="http://schemas.microsoft.com/office/powerpoint/2010/main" val="3239566876"/>
+              </p:ext>
+            </p:extLst>
+          </p:nvPr>
+        </p:nvGraphicFramePr>
+        <p:xfrm>
+          <a:off x="6527800" y="1563688"/>
+          <a:ext cx="5039854" cy="1483360"/>
+        </p:xfrm>
+        <a:graphic>
+          <a:graphicData uri="http://schemas.openxmlformats.org/drawingml/2006/table">
+            <a:tbl>
+              <a:tblPr firstRow="1" bandRow="1">
+                <a:tableStyleId>{5C22544A-7EE6-4342-B048-85BDC9FD1C3A}</a:tableStyleId>
+              </a:tblPr>
+              <a:tblGrid>
+                <a:gridCol w="2273300">
+                  <a:extLst>
+                    <a:ext uri="{9D8B030D-6E8A-4147-A177-3AD203B41FA5}">
+                      <a16:colId xmlns:a16="http://schemas.microsoft.com/office/drawing/2014/main" val="1152472493"/>
+                    </a:ext>
+                  </a:extLst>
+                </a:gridCol>
+                <a:gridCol w="805180">
+                  <a:extLst>
+                    <a:ext uri="{9D8B030D-6E8A-4147-A177-3AD203B41FA5}">
+                      <a16:colId xmlns:a16="http://schemas.microsoft.com/office/drawing/2014/main" val="3994125328"/>
+                    </a:ext>
+                  </a:extLst>
+                </a:gridCol>
+                <a:gridCol w="1961374">
+                  <a:extLst>
+                    <a:ext uri="{9D8B030D-6E8A-4147-A177-3AD203B41FA5}">
+                      <a16:colId xmlns:a16="http://schemas.microsoft.com/office/drawing/2014/main" val="331443097"/>
+                    </a:ext>
+                  </a:extLst>
+                </a:gridCol>
+              </a:tblGrid>
+              <a:tr h="370840">
+                <a:tc>
+                  <a:txBody>
+                    <a:bodyPr/>
+                    <a:lstStyle/>
+                    <a:p>
+                      <a:r>
+                        <a:rPr lang="en-US" dirty="0"/>
+                        <a:t>Official</a:t>
+                      </a:r>
+                    </a:p>
+                  </a:txBody>
+                  <a:tcPr/>
+                </a:tc>
+                <a:tc>
+                  <a:txBody>
+                    <a:bodyPr/>
+                    <a:lstStyle/>
+                    <a:p>
+                      <a:r>
+                        <a:rPr lang="en-US" dirty="0"/>
+                        <a:t>Rank</a:t>
+                      </a:r>
+                    </a:p>
+                  </a:txBody>
+                  <a:tcPr/>
+                </a:tc>
+                <a:tc>
+                  <a:txBody>
+                    <a:bodyPr/>
+                    <a:lstStyle/>
+                    <a:p>
+                      <a:r>
+                        <a:rPr lang="en-US" dirty="0"/>
+                        <a:t>Percentage</a:t>
+                      </a:r>
+                    </a:p>
+                  </a:txBody>
+                  <a:tcPr/>
+                </a:tc>
+                <a:extLst>
+                  <a:ext uri="{0D108BD9-81ED-4DB2-BD59-A6C34878D82A}">
+                    <a16:rowId xmlns:a16="http://schemas.microsoft.com/office/drawing/2014/main" val="1447378793"/>
+                  </a:ext>
+                </a:extLst>
+              </a:tr>
+              <a:tr h="370840">
+                <a:tc>
+                  <a:txBody>
+                    <a:bodyPr/>
+                    <a:lstStyle/>
+                    <a:p>
+                      <a:r>
+                        <a:rPr lang="en-US" dirty="0"/>
+                        <a:t>Bennie Adams</a:t>
+                      </a:r>
+                    </a:p>
+                  </a:txBody>
+                  <a:tcPr/>
+                </a:tc>
+                <a:tc>
+                  <a:txBody>
+                    <a:bodyPr/>
+                    <a:lstStyle/>
+                    <a:p>
+                      <a:r>
+                        <a:rPr lang="en-US" dirty="0"/>
+                        <a:t>1</a:t>
+                      </a:r>
+                    </a:p>
+                  </a:txBody>
+                  <a:tcPr/>
+                </a:tc>
+                <a:tc>
+                  <a:txBody>
+                    <a:bodyPr/>
+                    <a:lstStyle/>
+                    <a:p>
+                      <a:r>
+                        <a:rPr lang="en-US" dirty="0"/>
+                        <a:t>89.8%</a:t>
+                      </a:r>
+                    </a:p>
+                  </a:txBody>
+                  <a:tcPr/>
+                </a:tc>
+                <a:extLst>
+                  <a:ext uri="{0D108BD9-81ED-4DB2-BD59-A6C34878D82A}">
+                    <a16:rowId xmlns:a16="http://schemas.microsoft.com/office/drawing/2014/main" val="2486154750"/>
+                  </a:ext>
+                </a:extLst>
+              </a:tr>
+              <a:tr h="370840">
+                <a:tc>
+                  <a:txBody>
+                    <a:bodyPr/>
+                    <a:lstStyle/>
+                    <a:p>
+                      <a:r>
+                        <a:rPr lang="en-US" dirty="0" err="1"/>
+                        <a:t>Phenziee</a:t>
+                      </a:r>
+                      <a:r>
+                        <a:rPr lang="en-US" dirty="0"/>
+                        <a:t> Ransom</a:t>
+                      </a:r>
+                    </a:p>
+                  </a:txBody>
+                  <a:tcPr/>
+                </a:tc>
+                <a:tc>
+                  <a:txBody>
+                    <a:bodyPr/>
+                    <a:lstStyle/>
+                    <a:p>
+                      <a:r>
+                        <a:rPr lang="en-US" dirty="0"/>
+                        <a:t>2</a:t>
+                      </a:r>
+                    </a:p>
+                  </a:txBody>
+                  <a:tcPr/>
+                </a:tc>
+                <a:tc>
+                  <a:txBody>
+                    <a:bodyPr/>
+                    <a:lstStyle/>
+                    <a:p>
+                      <a:r>
+                        <a:rPr lang="en-US" dirty="0"/>
+                        <a:t>89.7%</a:t>
+                      </a:r>
+                    </a:p>
+                  </a:txBody>
+                  <a:tcPr/>
+                </a:tc>
+                <a:extLst>
+                  <a:ext uri="{0D108BD9-81ED-4DB2-BD59-A6C34878D82A}">
+                    <a16:rowId xmlns:a16="http://schemas.microsoft.com/office/drawing/2014/main" val="1298332794"/>
+                  </a:ext>
+                </a:extLst>
+              </a:tr>
+              <a:tr h="370840">
+                <a:tc>
+                  <a:txBody>
+                    <a:bodyPr/>
+                    <a:lstStyle/>
+                    <a:p>
+                      <a:r>
+                        <a:rPr lang="en-US" dirty="0"/>
+                        <a:t>Brett </a:t>
+                      </a:r>
+                      <a:r>
+                        <a:rPr lang="en-US" dirty="0" err="1"/>
+                        <a:t>Nansel</a:t>
+                      </a:r>
+                      <a:endParaRPr lang="en-US" dirty="0"/>
+                    </a:p>
+                  </a:txBody>
+                  <a:tcPr/>
+                </a:tc>
+                <a:tc>
+                  <a:txBody>
+                    <a:bodyPr/>
+                    <a:lstStyle/>
+                    <a:p>
+                      <a:r>
+                        <a:rPr lang="en-US" dirty="0"/>
+                        <a:t>3</a:t>
+                      </a:r>
+                    </a:p>
+                  </a:txBody>
+                  <a:tcPr/>
+                </a:tc>
+                <a:tc>
+                  <a:txBody>
+                    <a:bodyPr/>
+                    <a:lstStyle/>
+                    <a:p>
+                      <a:r>
+                        <a:rPr lang="en-US" dirty="0"/>
+                        <a:t>88.5%</a:t>
+                      </a:r>
+                    </a:p>
+                  </a:txBody>
+                  <a:tcPr/>
+                </a:tc>
+                <a:extLst>
+                  <a:ext uri="{0D108BD9-81ED-4DB2-BD59-A6C34878D82A}">
+                    <a16:rowId xmlns:a16="http://schemas.microsoft.com/office/drawing/2014/main" val="408068890"/>
+                  </a:ext>
+                </a:extLst>
+              </a:tr>
+            </a:tbl>
+          </a:graphicData>
+        </a:graphic>
+      </p:graphicFrame>
+      <p:graphicFrame>
+        <p:nvGraphicFramePr>
+          <p:cNvPr id="17" name="Table 17">
+            <a:extLst>
+              <a:ext uri="{FF2B5EF4-FFF2-40B4-BE49-F238E27FC236}">
+                <a16:creationId xmlns:a16="http://schemas.microsoft.com/office/drawing/2014/main" id="{EC298422-1145-0B4C-8837-CFDFAFB2A070}"/>
+              </a:ext>
+            </a:extLst>
+          </p:cNvPr>
+          <p:cNvGraphicFramePr>
+            <a:graphicFrameLocks noGrp="1"/>
+          </p:cNvGraphicFramePr>
+          <p:nvPr>
+            <p:ph idx="22"/>
+          </p:nvPr>
+        </p:nvGraphicFramePr>
+        <p:xfrm>
+          <a:off x="6527800" y="4170363"/>
+          <a:ext cx="4926754" cy="1483360"/>
+        </p:xfrm>
+        <a:graphic>
+          <a:graphicData uri="http://schemas.openxmlformats.org/drawingml/2006/table">
+            <a:tbl>
+              <a:tblPr firstRow="1" bandRow="1">
+                <a:tableStyleId>{5C22544A-7EE6-4342-B048-85BDC9FD1C3A}</a:tableStyleId>
+              </a:tblPr>
+              <a:tblGrid>
+                <a:gridCol w="2363153">
+                  <a:extLst>
+                    <a:ext uri="{9D8B030D-6E8A-4147-A177-3AD203B41FA5}">
+                      <a16:colId xmlns:a16="http://schemas.microsoft.com/office/drawing/2014/main" val="646766393"/>
+                    </a:ext>
+                  </a:extLst>
+                </a:gridCol>
+                <a:gridCol w="805180">
+                  <a:extLst>
+                    <a:ext uri="{9D8B030D-6E8A-4147-A177-3AD203B41FA5}">
+                      <a16:colId xmlns:a16="http://schemas.microsoft.com/office/drawing/2014/main" val="681690189"/>
+                    </a:ext>
+                  </a:extLst>
+                </a:gridCol>
+                <a:gridCol w="1758421">
+                  <a:extLst>
+                    <a:ext uri="{9D8B030D-6E8A-4147-A177-3AD203B41FA5}">
+                      <a16:colId xmlns:a16="http://schemas.microsoft.com/office/drawing/2014/main" val="1336115010"/>
+                    </a:ext>
+                  </a:extLst>
+                </a:gridCol>
+              </a:tblGrid>
+              <a:tr h="370840">
+                <a:tc>
+                  <a:txBody>
+                    <a:bodyPr/>
+                    <a:lstStyle/>
+                    <a:p>
+                      <a:r>
+                        <a:rPr lang="en-US" dirty="0"/>
+                        <a:t>Official</a:t>
+                      </a:r>
+                    </a:p>
+                  </a:txBody>
+                  <a:tcPr/>
+                </a:tc>
+                <a:tc>
+                  <a:txBody>
+                    <a:bodyPr/>
+                    <a:lstStyle/>
+                    <a:p>
+                      <a:r>
+                        <a:rPr lang="en-US" dirty="0"/>
+                        <a:t>Rank</a:t>
+                      </a:r>
+                    </a:p>
+                  </a:txBody>
+                  <a:tcPr/>
+                </a:tc>
+                <a:tc>
+                  <a:txBody>
+                    <a:bodyPr/>
+                    <a:lstStyle/>
+                    <a:p>
+                      <a:r>
+                        <a:rPr lang="en-US" dirty="0"/>
+                        <a:t>Percentage</a:t>
+                      </a:r>
+                    </a:p>
+                  </a:txBody>
+                  <a:tcPr/>
+                </a:tc>
+                <a:extLst>
+                  <a:ext uri="{0D108BD9-81ED-4DB2-BD59-A6C34878D82A}">
+                    <a16:rowId xmlns:a16="http://schemas.microsoft.com/office/drawing/2014/main" val="655686281"/>
+                  </a:ext>
+                </a:extLst>
+              </a:tr>
+              <a:tr h="370840">
+                <a:tc>
+                  <a:txBody>
+                    <a:bodyPr/>
+                    <a:lstStyle/>
+                    <a:p>
+                      <a:r>
+                        <a:rPr lang="en-US" dirty="0"/>
+                        <a:t>Haywoode Workman</a:t>
+                      </a:r>
+                    </a:p>
+                  </a:txBody>
+                  <a:tcPr/>
+                </a:tc>
+                <a:tc>
+                  <a:txBody>
+                    <a:bodyPr/>
+                    <a:lstStyle/>
+                    <a:p>
+                      <a:r>
+                        <a:rPr lang="en-US" dirty="0"/>
+                        <a:t>72</a:t>
+                      </a:r>
+                    </a:p>
+                  </a:txBody>
+                  <a:tcPr/>
+                </a:tc>
+                <a:tc>
+                  <a:txBody>
+                    <a:bodyPr/>
+                    <a:lstStyle/>
+                    <a:p>
+                      <a:r>
+                        <a:rPr lang="en-US" dirty="0"/>
+                        <a:t>9.2%</a:t>
+                      </a:r>
+                    </a:p>
+                  </a:txBody>
+                  <a:tcPr/>
+                </a:tc>
+                <a:extLst>
+                  <a:ext uri="{0D108BD9-81ED-4DB2-BD59-A6C34878D82A}">
+                    <a16:rowId xmlns:a16="http://schemas.microsoft.com/office/drawing/2014/main" val="1508582785"/>
+                  </a:ext>
+                </a:extLst>
+              </a:tr>
+              <a:tr h="370840">
+                <a:tc>
+                  <a:txBody>
+                    <a:bodyPr/>
+                    <a:lstStyle/>
+                    <a:p>
+                      <a:r>
+                        <a:rPr lang="en-US" dirty="0"/>
+                        <a:t>Matt Boland</a:t>
+                      </a:r>
+                    </a:p>
+                  </a:txBody>
+                  <a:tcPr/>
+                </a:tc>
+                <a:tc>
+                  <a:txBody>
+                    <a:bodyPr/>
+                    <a:lstStyle/>
+                    <a:p>
+                      <a:r>
+                        <a:rPr lang="en-US" dirty="0"/>
+                        <a:t>71</a:t>
+                      </a:r>
+                    </a:p>
+                  </a:txBody>
+                  <a:tcPr/>
+                </a:tc>
+                <a:tc>
+                  <a:txBody>
+                    <a:bodyPr/>
+                    <a:lstStyle/>
+                    <a:p>
+                      <a:r>
+                        <a:rPr lang="en-US" b="0" dirty="0"/>
+                        <a:t>8.9%</a:t>
+                      </a:r>
+                    </a:p>
+                  </a:txBody>
+                  <a:tcPr/>
+                </a:tc>
+                <a:extLst>
+                  <a:ext uri="{0D108BD9-81ED-4DB2-BD59-A6C34878D82A}">
+                    <a16:rowId xmlns:a16="http://schemas.microsoft.com/office/drawing/2014/main" val="2452456301"/>
+                  </a:ext>
+                </a:extLst>
+              </a:tr>
+              <a:tr h="370840">
+                <a:tc>
+                  <a:txBody>
+                    <a:bodyPr/>
+                    <a:lstStyle/>
+                    <a:p>
+                      <a:r>
+                        <a:rPr lang="en-US" dirty="0"/>
+                        <a:t>John Conley</a:t>
+                      </a:r>
+                    </a:p>
+                  </a:txBody>
+                  <a:tcPr/>
+                </a:tc>
+                <a:tc>
+                  <a:txBody>
+                    <a:bodyPr/>
+                    <a:lstStyle/>
+                    <a:p>
+                      <a:r>
+                        <a:rPr lang="en-US" dirty="0"/>
+                        <a:t>70</a:t>
+                      </a:r>
+                    </a:p>
+                  </a:txBody>
+                  <a:tcPr/>
+                </a:tc>
+                <a:tc>
+                  <a:txBody>
+                    <a:bodyPr/>
+                    <a:lstStyle/>
+                    <a:p>
+                      <a:r>
+                        <a:rPr lang="en-US" dirty="0"/>
+                        <a:t>8.5%</a:t>
+                      </a:r>
+                    </a:p>
+                  </a:txBody>
+                  <a:tcPr/>
+                </a:tc>
+                <a:extLst>
+                  <a:ext uri="{0D108BD9-81ED-4DB2-BD59-A6C34878D82A}">
+                    <a16:rowId xmlns:a16="http://schemas.microsoft.com/office/drawing/2014/main" val="2727737611"/>
+                  </a:ext>
+                </a:extLst>
+              </a:tr>
+            </a:tbl>
+          </a:graphicData>
+        </a:graphic>
+      </p:graphicFrame>
+      <p:sp>
+        <p:nvSpPr>
+          <p:cNvPr id="6" name="Title 5">
+            <a:extLst>
+              <a:ext uri="{FF2B5EF4-FFF2-40B4-BE49-F238E27FC236}">
+                <a16:creationId xmlns:a16="http://schemas.microsoft.com/office/drawing/2014/main" id="{388EF6F7-5CE8-BB47-84D5-D92080497422}"/>
+              </a:ext>
+            </a:extLst>
+          </p:cNvPr>
+          <p:cNvSpPr>
+            <a:spLocks noGrp="1"/>
+          </p:cNvSpPr>
+          <p:nvPr>
+            <p:ph type="title"/>
+          </p:nvPr>
+        </p:nvSpPr>
+        <p:spPr/>
+        <p:txBody>
+          <a:bodyPr/>
+          <a:lstStyle/>
+          <a:p>
+            <a:r>
+              <a:rPr lang="en-US" dirty="0"/>
+              <a:t>Half Court Metrics</a:t>
+            </a:r>
+          </a:p>
+        </p:txBody>
+      </p:sp>
+      <p:sp>
+        <p:nvSpPr>
+          <p:cNvPr id="7" name="Subtitle 6">
+            <a:extLst>
+              <a:ext uri="{FF2B5EF4-FFF2-40B4-BE49-F238E27FC236}">
+                <a16:creationId xmlns:a16="http://schemas.microsoft.com/office/drawing/2014/main" id="{7120B7AA-289A-C14B-9153-D9776F714588}"/>
+              </a:ext>
+            </a:extLst>
+          </p:cNvPr>
+          <p:cNvSpPr>
+            <a:spLocks noGrp="1"/>
+          </p:cNvSpPr>
+          <p:nvPr>
+            <p:ph type="subTitle" idx="1"/>
+          </p:nvPr>
+        </p:nvSpPr>
+        <p:spPr/>
+        <p:txBody>
+          <a:bodyPr/>
+          <a:lstStyle/>
+          <a:p>
+            <a:r>
+              <a:rPr lang="en-US" dirty="0"/>
+              <a:t>Slot by FT Line Extended</a:t>
+            </a:r>
+          </a:p>
+          <a:p>
+            <a:endParaRPr lang="en-US" dirty="0"/>
+          </a:p>
+        </p:txBody>
+      </p:sp>
+    </p:spTree>
+    <p:extLst>
+      <p:ext uri="{BB962C8B-B14F-4D97-AF65-F5344CB8AC3E}">
+        <p14:creationId xmlns:p14="http://schemas.microsoft.com/office/powerpoint/2010/main" val="3613483496"/>
+      </p:ext>
+    </p:extLst>
+  </p:cSld>
+  <p:clrMapOvr>
+    <a:masterClrMapping/>
+  </p:clrMapOvr>
+</p:sld>
+</file>
+
+<file path=ppt/slides/slide12.xml><?xml version="1.0" encoding="utf-8"?>
+<p:sld xmlns:a="http://schemas.openxmlformats.org/drawingml/2006/main" xmlns:r="http://schemas.openxmlformats.org/officeDocument/2006/relationships" xmlns:p="http://schemas.openxmlformats.org/presentationml/2006/main">
+  <p:cSld>
+    <p:spTree>
+      <p:nvGrpSpPr>
+        <p:cNvPr id="1" name=""/>
+        <p:cNvGrpSpPr/>
+        <p:nvPr/>
+      </p:nvGrpSpPr>
+      <p:grpSpPr>
+        <a:xfrm>
+          <a:off x="0" y="0"/>
+          <a:ext cx="0" cy="0"/>
+          <a:chOff x="0" y="0"/>
+          <a:chExt cx="0" cy="0"/>
+        </a:xfrm>
+      </p:grpSpPr>
+      <p:sp>
+        <p:nvSpPr>
+          <p:cNvPr id="9" name="Content Placeholder 8">
+            <a:extLst>
+              <a:ext uri="{FF2B5EF4-FFF2-40B4-BE49-F238E27FC236}">
+                <a16:creationId xmlns:a16="http://schemas.microsoft.com/office/drawing/2014/main" id="{C3180D1D-F4A7-D745-ABB4-EA8C3494AD35}"/>
+              </a:ext>
+            </a:extLst>
+          </p:cNvPr>
+          <p:cNvSpPr>
+            <a:spLocks noGrp="1"/>
+          </p:cNvSpPr>
+          <p:nvPr>
+            <p:ph idx="14"/>
+          </p:nvPr>
+        </p:nvSpPr>
+        <p:spPr>
+          <a:xfrm>
+            <a:off x="500139" y="1563625"/>
+            <a:ext cx="5276088" cy="4690871"/>
+          </a:xfrm>
+        </p:spPr>
+        <p:txBody>
+          <a:bodyPr/>
+          <a:lstStyle/>
+          <a:p>
+            <a:pPr>
+              <a:buNone/>
+            </a:pPr>
+            <a:r>
+              <a:rPr lang="en-US" dirty="0"/>
+              <a:t>Percentage of time the trail is behind the basketball in half court</a:t>
+            </a:r>
+          </a:p>
+          <a:p>
+            <a:pPr>
+              <a:buNone/>
+            </a:pPr>
+            <a:endParaRPr lang="en-US" dirty="0"/>
+          </a:p>
+          <a:p>
+            <a:pPr>
+              <a:buNone/>
+            </a:pPr>
+            <a:endParaRPr lang="en-US" dirty="0"/>
+          </a:p>
+          <a:p>
+            <a:pPr>
+              <a:buNone/>
+            </a:pPr>
+            <a:r>
+              <a:rPr lang="en-US" dirty="0"/>
+              <a:t>Ranked from largest to smallest percentage</a:t>
+            </a:r>
+          </a:p>
+          <a:p>
+            <a:pPr>
+              <a:buNone/>
+            </a:pPr>
+            <a:endParaRPr lang="en-US" dirty="0"/>
+          </a:p>
+        </p:txBody>
+      </p:sp>
+      <p:graphicFrame>
+        <p:nvGraphicFramePr>
+          <p:cNvPr id="16" name="Table 16">
+            <a:extLst>
+              <a:ext uri="{FF2B5EF4-FFF2-40B4-BE49-F238E27FC236}">
+                <a16:creationId xmlns:a16="http://schemas.microsoft.com/office/drawing/2014/main" id="{8B2DA1A7-5F68-9A41-A21E-DD4740E0CB8B}"/>
+              </a:ext>
+            </a:extLst>
+          </p:cNvPr>
+          <p:cNvGraphicFramePr>
+            <a:graphicFrameLocks noGrp="1"/>
+          </p:cNvGraphicFramePr>
+          <p:nvPr>
+            <p:ph idx="20"/>
+            <p:extLst>
+              <p:ext uri="{D42A27DB-BD31-4B8C-83A1-F6EECF244321}">
+                <p14:modId xmlns:p14="http://schemas.microsoft.com/office/powerpoint/2010/main" val="2729973546"/>
               </p:ext>
             </p:extLst>
           </p:nvPr>
@@ -41618,7 +42898,7 @@
                     <a:p>
                       <a:r>
                         <a:rPr lang="en-US" dirty="0"/>
-                        <a:t>96.7%</a:t>
+                        <a:t>86.7%</a:t>
                       </a:r>
                     </a:p>
                   </a:txBody>
@@ -41948,7 +43228,7 @@
 </p:sld>
 </file>
 
-<file path=ppt/slides/slide11.xml><?xml version="1.0" encoding="utf-8"?>
+<file path=ppt/slides/slide13.xml><?xml version="1.0" encoding="utf-8"?>
 <p:sld xmlns:a="http://schemas.openxmlformats.org/drawingml/2006/main" xmlns:r="http://schemas.openxmlformats.org/officeDocument/2006/relationships" xmlns:p="http://schemas.openxmlformats.org/presentationml/2006/main">
   <p:cSld>
     <p:spTree>
@@ -42014,27 +43294,45 @@
           <a:bodyPr/>
           <a:lstStyle/>
           <a:p>
+            <a:endParaRPr lang="en-US" dirty="0"/>
+          </a:p>
+          <a:p>
             <a:r>
               <a:rPr lang="en-US" dirty="0"/>
-              <a:t>Finalize Lead/Slot/Trail Identification Process</a:t>
+              <a:t>Finalize Metrics</a:t>
             </a:r>
           </a:p>
           <a:p>
-            <a:endParaRPr lang="en-US" dirty="0"/>
-          </a:p>
-          <a:p>
+            <a:pPr lvl="1"/>
             <a:r>
               <a:rPr lang="en-US" dirty="0"/>
-              <a:t>Define Slot Half Court Metric</a:t>
+              <a:t>Brainstorm additional metrics</a:t>
             </a:r>
           </a:p>
           <a:p>
+            <a:pPr marL="228600" lvl="1" indent="0">
+              <a:buNone/>
+            </a:pPr>
             <a:endParaRPr lang="en-US" dirty="0"/>
           </a:p>
           <a:p>
             <a:r>
               <a:rPr lang="en-US" dirty="0"/>
               <a:t>Collect possession level data and compare it to errors</a:t>
+            </a:r>
+          </a:p>
+          <a:p>
+            <a:pPr lvl="1"/>
+            <a:r>
+              <a:rPr lang="en-US" dirty="0"/>
+              <a:t>Play Selection for Reviewers/DAs</a:t>
+            </a:r>
+          </a:p>
+          <a:p>
+            <a:pPr lvl="1"/>
+            <a:r>
+              <a:rPr lang="en-US" dirty="0"/>
+              <a:t>Investigate metric thresholds</a:t>
             </a:r>
           </a:p>
         </p:txBody>
@@ -42071,7 +43369,7 @@
 </p:sld>
 </file>
 
-<file path=ppt/slides/slide12.xml><?xml version="1.0" encoding="utf-8"?>
+<file path=ppt/slides/slide14.xml><?xml version="1.0" encoding="utf-8"?>
 <p:sld xmlns:a="http://schemas.openxmlformats.org/drawingml/2006/main" xmlns:r="http://schemas.openxmlformats.org/officeDocument/2006/relationships" xmlns:p="http://schemas.openxmlformats.org/presentationml/2006/main">
   <p:cSld>
     <p:spTree>
@@ -43467,7 +44765,7 @@
             </a:pPr>
             <a:r>
               <a:rPr lang="en-US" dirty="0"/>
-              <a:t>Slot’s distance, in feet &amp; inches, from the middle of the ten players</a:t>
+              <a:t>Slot’s angle of view, in degrees, to the middle of the pack</a:t>
             </a:r>
           </a:p>
           <a:p>
@@ -43488,7 +44786,7 @@
             </a:pPr>
             <a:r>
               <a:rPr lang="en-US" dirty="0"/>
-              <a:t>Ranked from smallest to largest distance</a:t>
+              <a:t>Ranked from largest to smallest angle</a:t>
             </a:r>
           </a:p>
           <a:p>
@@ -43515,7 +44813,7 @@
             <p:ph idx="20"/>
             <p:extLst>
               <p:ext uri="{D42A27DB-BD31-4B8C-83A1-F6EECF244321}">
-                <p14:modId xmlns:p14="http://schemas.microsoft.com/office/powerpoint/2010/main" val="1691768435"/>
+                <p14:modId xmlns:p14="http://schemas.microsoft.com/office/powerpoint/2010/main" val="3508686229"/>
               </p:ext>
             </p:extLst>
           </p:nvPr>
@@ -43587,7 +44885,7 @@
                     <a:p>
                       <a:r>
                         <a:rPr lang="en-US" dirty="0"/>
-                        <a:t>Distance</a:t>
+                        <a:t>Angle</a:t>
                       </a:r>
                     </a:p>
                   </a:txBody>
@@ -43607,7 +44905,7 @@
                     <a:p>
                       <a:r>
                         <a:rPr lang="en-US" dirty="0"/>
-                        <a:t>Natalie Sago</a:t>
+                        <a:t>TBD</a:t>
                       </a:r>
                     </a:p>
                   </a:txBody>
@@ -43633,7 +44931,7 @@
                     <a:p>
                       <a:r>
                         <a:rPr lang="en-US" dirty="0"/>
-                        <a:t>6’ 2”</a:t>
+                        <a:t>TBD</a:t>
                       </a:r>
                     </a:p>
                   </a:txBody>
@@ -43653,7 +44951,7 @@
                     <a:p>
                       <a:r>
                         <a:rPr lang="en-US" dirty="0"/>
-                        <a:t>Dedric Taylor</a:t>
+                        <a:t>TBD</a:t>
                       </a:r>
                     </a:p>
                   </a:txBody>
@@ -43679,7 +44977,7 @@
                     <a:p>
                       <a:r>
                         <a:rPr lang="en-US" dirty="0"/>
-                        <a:t>6’ 2”</a:t>
+                        <a:t>TBD</a:t>
                       </a:r>
                     </a:p>
                   </a:txBody>
@@ -43699,7 +44997,7 @@
                     <a:p>
                       <a:r>
                         <a:rPr lang="en-US" dirty="0"/>
-                        <a:t>Matt Meyers</a:t>
+                        <a:t>TBD</a:t>
                       </a:r>
                     </a:p>
                   </a:txBody>
@@ -43725,7 +45023,7 @@
                     <a:p>
                       <a:r>
                         <a:rPr lang="en-US" dirty="0"/>
-                        <a:t>6’ 3”</a:t>
+                        <a:t>TBD</a:t>
                       </a:r>
                     </a:p>
                   </a:txBody>
@@ -43757,7 +45055,7 @@
             <p:ph idx="22"/>
             <p:extLst>
               <p:ext uri="{D42A27DB-BD31-4B8C-83A1-F6EECF244321}">
-                <p14:modId xmlns:p14="http://schemas.microsoft.com/office/powerpoint/2010/main" val="2076363341"/>
+                <p14:modId xmlns:p14="http://schemas.microsoft.com/office/powerpoint/2010/main" val="4174725902"/>
               </p:ext>
             </p:extLst>
           </p:nvPr>
@@ -43849,7 +45147,7 @@
                     <a:p>
                       <a:r>
                         <a:rPr lang="en-US" dirty="0"/>
-                        <a:t>Haywoode Workman</a:t>
+                        <a:t>TBD</a:t>
                       </a:r>
                     </a:p>
                   </a:txBody>
@@ -43875,7 +45173,7 @@
                     <a:p>
                       <a:r>
                         <a:rPr lang="en-US" dirty="0"/>
-                        <a:t>9’ 6”</a:t>
+                        <a:t>TBD</a:t>
                       </a:r>
                     </a:p>
                   </a:txBody>
@@ -43895,7 +45193,7 @@
                     <a:p>
                       <a:r>
                         <a:rPr lang="en-US" dirty="0"/>
-                        <a:t>Scott Foster</a:t>
+                        <a:t>TBD</a:t>
                       </a:r>
                     </a:p>
                   </a:txBody>
@@ -43921,7 +45219,7 @@
                     <a:p>
                       <a:r>
                         <a:rPr lang="en-US" b="0" dirty="0"/>
-                        <a:t>9’ 3”</a:t>
+                        <a:t>TBD</a:t>
                       </a:r>
                     </a:p>
                   </a:txBody>
@@ -43941,7 +45239,7 @@
                     <a:p>
                       <a:r>
                         <a:rPr lang="en-US" dirty="0"/>
-                        <a:t>Tre Maddox</a:t>
+                        <a:t>TBD</a:t>
                       </a:r>
                     </a:p>
                   </a:txBody>
@@ -43967,7 +45265,7 @@
                     <a:p>
                       <a:r>
                         <a:rPr lang="en-US" dirty="0"/>
-                        <a:t>9’ 1”</a:t>
+                        <a:t>TBD</a:t>
                       </a:r>
                     </a:p>
                   </a:txBody>
@@ -44034,7 +45332,7 @@
           <a:p>
             <a:r>
               <a:rPr lang="en-US" dirty="0"/>
-              <a:t>Slot Distance from Pack</a:t>
+              <a:t>Slot Angle to Pack</a:t>
             </a:r>
           </a:p>
           <a:p>

</xml_diff>